<commit_message>
final push. 3rd place out of 8, great job!
</commit_message>
<xml_diff>
--- a/smartTrafficGridPresentation.pptx
+++ b/smartTrafficGridPresentation.pptx
@@ -12,6 +12,7 @@
     <p:sldId id="262" r:id="rId6"/>
     <p:sldId id="261" r:id="rId7"/>
     <p:sldId id="259" r:id="rId8"/>
+    <p:sldId id="263" r:id="rId9"/>
   </p:sldIdLst>
   <p:sldSz cx="9144000" cy="6858000" type="screen4x3"/>
   <p:notesSz cx="6858000" cy="9144000"/>
@@ -14322,7 +14323,7 @@
         </p:nvSpPr>
         <p:spPr>
           <a:xfrm>
-            <a:off x="5397667" y="2617237"/>
+            <a:off x="6062361" y="3402067"/>
             <a:ext cx="1610988" cy="1938992"/>
           </a:xfrm>
           <a:prstGeom prst="rect">
@@ -14388,7 +14389,7 @@
         </p:nvSpPr>
         <p:spPr>
           <a:xfrm>
-            <a:off x="1304059" y="2617237"/>
+            <a:off x="1304059" y="3402067"/>
             <a:ext cx="2078063" cy="1569660"/>
           </a:xfrm>
           <a:prstGeom prst="rect">
@@ -14432,6 +14433,40 @@
             <a:endParaRPr lang="en-US" sz="2400" dirty="0">
               <a:latin typeface="+mj-lt"/>
             </a:endParaRPr>
+          </a:p>
+        </p:txBody>
+      </p:sp>
+      <p:sp>
+        <p:nvSpPr>
+          <p:cNvPr id="3" name="TextBox 2"/>
+          <p:cNvSpPr txBox="1"/>
+          <p:nvPr/>
+        </p:nvSpPr>
+        <p:spPr>
+          <a:xfrm>
+            <a:off x="3382122" y="2878847"/>
+            <a:ext cx="2149923" cy="523220"/>
+          </a:xfrm>
+          <a:prstGeom prst="rect">
+            <a:avLst/>
+          </a:prstGeom>
+          <a:noFill/>
+        </p:spPr>
+        <p:txBody>
+          <a:bodyPr wrap="none" rtlCol="0">
+            <a:spAutoFit/>
+          </a:bodyPr>
+          <a:lstStyle/>
+          <a:p>
+            <a:r>
+              <a:rPr lang="en-US" sz="2800" dirty="0" smtClean="0"/>
+              <a:t>The </a:t>
+            </a:r>
+            <a:r>
+              <a:rPr lang="en-US" sz="2800" dirty="0" err="1" smtClean="0"/>
+              <a:t>Resistars</a:t>
+            </a:r>
+            <a:endParaRPr lang="en-US" sz="2800" dirty="0"/>
           </a:p>
         </p:txBody>
       </p:sp>
@@ -14963,6 +14998,9 @@
           <a:bodyPr/>
           <a:lstStyle/>
           <a:p>
+            <a:pPr marL="68580" indent="0">
+              <a:buNone/>
+            </a:pPr>
             <a:endParaRPr lang="en-US" dirty="0"/>
           </a:p>
         </p:txBody>
@@ -15131,7 +15169,7 @@
       </p:sp>
       <p:pic>
         <p:nvPicPr>
-          <p:cNvPr id="4" name="Content Placeholder 3" descr="Screen Shot 2015-02-22 at 11.53.17.png"/>
+          <p:cNvPr id="7" name="Content Placeholder 6" descr="Screen Shot 2015-02-22 at 15.06.26.png"/>
           <p:cNvPicPr>
             <a:picLocks noGrp="1" noChangeAspect="1"/>
           </p:cNvPicPr>
@@ -15147,21 +15185,21 @@
               </a:ext>
             </a:extLst>
           </a:blip>
-          <a:srcRect l="8367" r="8367"/>
+          <a:srcRect l="9836" r="9836"/>
           <a:stretch>
             <a:fillRect/>
           </a:stretch>
         </p:blipFill>
         <p:spPr>
           <a:xfrm>
-            <a:off x="300251" y="1417637"/>
-            <a:ext cx="8616025" cy="4139071"/>
+            <a:off x="305771" y="1417638"/>
+            <a:ext cx="8474389" cy="4071030"/>
           </a:xfrm>
         </p:spPr>
       </p:pic>
       <p:pic>
         <p:nvPicPr>
-          <p:cNvPr id="5" name="Picture 4" descr="Screen Shot 2015-02-22 at 14.50.22.png"/>
+          <p:cNvPr id="8" name="Picture 7" descr="Screen Shot 2015-02-22 at 15.06.58.png"/>
           <p:cNvPicPr>
             <a:picLocks noChangeAspect="1"/>
           </p:cNvPicPr>
@@ -15181,8 +15219,8 @@
         </p:blipFill>
         <p:spPr>
           <a:xfrm>
-            <a:off x="1528528" y="5712054"/>
-            <a:ext cx="5588000" cy="990600"/>
+            <a:off x="1514924" y="5607273"/>
+            <a:ext cx="5829300" cy="1028700"/>
           </a:xfrm>
           <a:prstGeom prst="rect">
             <a:avLst/>
@@ -15193,6 +15231,90 @@
     <p:extLst>
       <p:ext uri="{BB962C8B-B14F-4D97-AF65-F5344CB8AC3E}">
         <p14:creationId xmlns:p14="http://schemas.microsoft.com/office/powerpoint/2010/main" val="4277564095"/>
+      </p:ext>
+    </p:extLst>
+  </p:cSld>
+  <p:clrMapOvr>
+    <a:masterClrMapping/>
+  </p:clrMapOvr>
+</p:sld>
+</file>
+
+<file path=ppt/slides/slide8.xml><?xml version="1.0" encoding="utf-8"?>
+<p:sld xmlns:a="http://schemas.openxmlformats.org/drawingml/2006/main" xmlns:r="http://schemas.openxmlformats.org/officeDocument/2006/relationships" xmlns:p="http://schemas.openxmlformats.org/presentationml/2006/main">
+  <p:cSld>
+    <p:spTree>
+      <p:nvGrpSpPr>
+        <p:cNvPr id="1" name=""/>
+        <p:cNvGrpSpPr/>
+        <p:nvPr/>
+      </p:nvGrpSpPr>
+      <p:grpSpPr>
+        <a:xfrm>
+          <a:off x="0" y="0"/>
+          <a:ext cx="0" cy="0"/>
+          <a:chOff x="0" y="0"/>
+          <a:chExt cx="0" cy="0"/>
+        </a:xfrm>
+      </p:grpSpPr>
+      <p:sp>
+        <p:nvSpPr>
+          <p:cNvPr id="2" name="Title 1"/>
+          <p:cNvSpPr>
+            <a:spLocks noGrp="1"/>
+          </p:cNvSpPr>
+          <p:nvPr>
+            <p:ph type="title"/>
+          </p:nvPr>
+        </p:nvSpPr>
+        <p:spPr/>
+        <p:txBody>
+          <a:bodyPr/>
+          <a:lstStyle/>
+          <a:p>
+            <a:r>
+              <a:rPr lang="en-US" dirty="0" smtClean="0"/>
+              <a:t>limitations</a:t>
+            </a:r>
+            <a:endParaRPr lang="en-US" dirty="0"/>
+          </a:p>
+        </p:txBody>
+      </p:sp>
+      <p:sp>
+        <p:nvSpPr>
+          <p:cNvPr id="3" name="Content Placeholder 2"/>
+          <p:cNvSpPr>
+            <a:spLocks noGrp="1"/>
+          </p:cNvSpPr>
+          <p:nvPr>
+            <p:ph idx="1"/>
+          </p:nvPr>
+        </p:nvSpPr>
+        <p:spPr/>
+        <p:txBody>
+          <a:bodyPr>
+            <a:normAutofit/>
+          </a:bodyPr>
+          <a:lstStyle/>
+          <a:p>
+            <a:r>
+              <a:rPr lang="en-US" sz="4000" dirty="0" smtClean="0"/>
+              <a:t>Viewing angle of cameras</a:t>
+            </a:r>
+          </a:p>
+          <a:p>
+            <a:r>
+              <a:rPr lang="en-US" sz="4000" dirty="0" smtClean="0"/>
+              <a:t>Algorithms need to be redesigned for every intersection</a:t>
+            </a:r>
+            <a:endParaRPr lang="en-US" sz="4000" dirty="0"/>
+          </a:p>
+        </p:txBody>
+      </p:sp>
+    </p:spTree>
+    <p:extLst>
+      <p:ext uri="{BB962C8B-B14F-4D97-AF65-F5344CB8AC3E}">
+        <p14:creationId xmlns:p14="http://schemas.microsoft.com/office/powerpoint/2010/main" val="1010868181"/>
       </p:ext>
     </p:extLst>
   </p:cSld>

</xml_diff>